<commit_message>
Updates to Presentation and Word Doc
</commit_message>
<xml_diff>
--- a/Documentation/Project Presentation/Charles-CodeCreated-UnitTest-Servers.pptx
+++ b/Documentation/Project Presentation/Charles-CodeCreated-UnitTest-Servers.pptx
@@ -6,8 +6,8 @@
   </p:sldMasterIdLst>
   <p:sldIdLst>
     <p:sldId id="256" r:id="rId2"/>
-    <p:sldId id="257" r:id="rId3"/>
-    <p:sldId id="259" r:id="rId4"/>
+    <p:sldId id="259" r:id="rId3"/>
+    <p:sldId id="257" r:id="rId4"/>
     <p:sldId id="260" r:id="rId5"/>
     <p:sldId id="261" r:id="rId6"/>
     <p:sldId id="262" r:id="rId7"/>
@@ -737,7 +737,8 @@
           <a:p>
             <a:fld id="{3246753B-1CBA-40BC-BB74-CA1BFC259E4F}" type="datetimeFigureOut">
               <a:rPr lang="en-IE" smtClean="0"/>
-              <a:t>24/04/2019</a:t>
+              <a:pPr/>
+              <a:t>26/04/2019</a:t>
             </a:fld>
             <a:endParaRPr lang="en-IE"/>
           </a:p>
@@ -799,6 +800,7 @@
           <a:p>
             <a:fld id="{6860702E-779E-4CA2-9A1D-C96F979818AE}" type="slidenum">
               <a:rPr lang="en-IE" smtClean="0"/>
+              <a:pPr/>
               <a:t>‹#›</a:t>
             </a:fld>
             <a:endParaRPr lang="en-IE"/>
@@ -933,7 +935,8 @@
           <a:p>
             <a:fld id="{3246753B-1CBA-40BC-BB74-CA1BFC259E4F}" type="datetimeFigureOut">
               <a:rPr lang="en-IE" smtClean="0"/>
-              <a:t>24/04/2019</a:t>
+              <a:pPr/>
+              <a:t>26/04/2019</a:t>
             </a:fld>
             <a:endParaRPr lang="en-IE"/>
           </a:p>
@@ -979,6 +982,7 @@
           <a:p>
             <a:fld id="{6860702E-779E-4CA2-9A1D-C96F979818AE}" type="slidenum">
               <a:rPr lang="en-IE" smtClean="0"/>
+              <a:pPr/>
               <a:t>‹#›</a:t>
             </a:fld>
             <a:endParaRPr lang="en-IE"/>
@@ -1118,7 +1122,8 @@
           <a:p>
             <a:fld id="{3246753B-1CBA-40BC-BB74-CA1BFC259E4F}" type="datetimeFigureOut">
               <a:rPr lang="en-IE" smtClean="0"/>
-              <a:t>24/04/2019</a:t>
+              <a:pPr/>
+              <a:t>26/04/2019</a:t>
             </a:fld>
             <a:endParaRPr lang="en-IE"/>
           </a:p>
@@ -1164,6 +1169,7 @@
           <a:p>
             <a:fld id="{6860702E-779E-4CA2-9A1D-C96F979818AE}" type="slidenum">
               <a:rPr lang="en-IE" smtClean="0"/>
+              <a:pPr/>
               <a:t>‹#›</a:t>
             </a:fld>
             <a:endParaRPr lang="en-IE"/>
@@ -1268,7 +1274,8 @@
           <a:p>
             <a:fld id="{3246753B-1CBA-40BC-BB74-CA1BFC259E4F}" type="datetimeFigureOut">
               <a:rPr lang="en-IE" smtClean="0"/>
-              <a:t>24/04/2019</a:t>
+              <a:pPr/>
+              <a:t>26/04/2019</a:t>
             </a:fld>
             <a:endParaRPr lang="en-IE"/>
           </a:p>
@@ -1314,6 +1321,7 @@
           <a:p>
             <a:fld id="{6860702E-779E-4CA2-9A1D-C96F979818AE}" type="slidenum">
               <a:rPr lang="en-IE" smtClean="0"/>
+              <a:pPr/>
               <a:t>‹#›</a:t>
             </a:fld>
             <a:endParaRPr lang="en-IE"/>
@@ -1523,7 +1531,8 @@
           <a:p>
             <a:fld id="{3246753B-1CBA-40BC-BB74-CA1BFC259E4F}" type="datetimeFigureOut">
               <a:rPr lang="en-IE" smtClean="0"/>
-              <a:t>24/04/2019</a:t>
+              <a:pPr/>
+              <a:t>26/04/2019</a:t>
             </a:fld>
             <a:endParaRPr lang="en-IE"/>
           </a:p>
@@ -1569,6 +1578,7 @@
           <a:p>
             <a:fld id="{6860702E-779E-4CA2-9A1D-C96F979818AE}" type="slidenum">
               <a:rPr lang="en-IE" smtClean="0"/>
+              <a:pPr/>
               <a:t>‹#›</a:t>
             </a:fld>
             <a:endParaRPr lang="en-IE"/>
@@ -1932,7 +1942,8 @@
           <a:p>
             <a:fld id="{3246753B-1CBA-40BC-BB74-CA1BFC259E4F}" type="datetimeFigureOut">
               <a:rPr lang="en-IE" smtClean="0"/>
-              <a:t>24/04/2019</a:t>
+              <a:pPr/>
+              <a:t>26/04/2019</a:t>
             </a:fld>
             <a:endParaRPr lang="en-IE"/>
           </a:p>
@@ -1978,6 +1989,7 @@
           <a:p>
             <a:fld id="{6860702E-779E-4CA2-9A1D-C96F979818AE}" type="slidenum">
               <a:rPr lang="en-IE" smtClean="0"/>
+              <a:pPr/>
               <a:t>‹#›</a:t>
             </a:fld>
             <a:endParaRPr lang="en-IE"/>
@@ -2378,7 +2390,8 @@
           <a:p>
             <a:fld id="{3246753B-1CBA-40BC-BB74-CA1BFC259E4F}" type="datetimeFigureOut">
               <a:rPr lang="en-IE" smtClean="0"/>
-              <a:t>24/04/2019</a:t>
+              <a:pPr/>
+              <a:t>26/04/2019</a:t>
             </a:fld>
             <a:endParaRPr lang="en-IE"/>
           </a:p>
@@ -2424,6 +2437,7 @@
           <a:p>
             <a:fld id="{6860702E-779E-4CA2-9A1D-C96F979818AE}" type="slidenum">
               <a:rPr lang="en-IE" smtClean="0"/>
+              <a:pPr/>
               <a:t>‹#›</a:t>
             </a:fld>
             <a:endParaRPr lang="en-IE"/>
@@ -2479,7 +2493,8 @@
           <a:p>
             <a:fld id="{3246753B-1CBA-40BC-BB74-CA1BFC259E4F}" type="datetimeFigureOut">
               <a:rPr lang="en-IE" smtClean="0"/>
-              <a:t>24/04/2019</a:t>
+              <a:pPr/>
+              <a:t>26/04/2019</a:t>
             </a:fld>
             <a:endParaRPr lang="en-IE"/>
           </a:p>
@@ -2525,6 +2540,7 @@
           <a:p>
             <a:fld id="{6860702E-779E-4CA2-9A1D-C96F979818AE}" type="slidenum">
               <a:rPr lang="en-IE" smtClean="0"/>
+              <a:pPr/>
               <a:t>‹#›</a:t>
             </a:fld>
             <a:endParaRPr lang="en-IE"/>
@@ -2600,7 +2616,8 @@
           <a:p>
             <a:fld id="{3246753B-1CBA-40BC-BB74-CA1BFC259E4F}" type="datetimeFigureOut">
               <a:rPr lang="en-IE" smtClean="0"/>
-              <a:t>24/04/2019</a:t>
+              <a:pPr/>
+              <a:t>26/04/2019</a:t>
             </a:fld>
             <a:endParaRPr lang="en-IE"/>
           </a:p>
@@ -2646,6 +2663,7 @@
           <a:p>
             <a:fld id="{6860702E-779E-4CA2-9A1D-C96F979818AE}" type="slidenum">
               <a:rPr lang="en-IE" smtClean="0"/>
+              <a:pPr/>
               <a:t>‹#›</a:t>
             </a:fld>
             <a:endParaRPr lang="en-IE"/>
@@ -2874,7 +2892,8 @@
           <a:p>
             <a:fld id="{3246753B-1CBA-40BC-BB74-CA1BFC259E4F}" type="datetimeFigureOut">
               <a:rPr lang="en-IE" smtClean="0"/>
-              <a:t>24/04/2019</a:t>
+              <a:pPr/>
+              <a:t>26/04/2019</a:t>
             </a:fld>
             <a:endParaRPr lang="en-IE"/>
           </a:p>
@@ -2920,6 +2939,7 @@
           <a:p>
             <a:fld id="{6860702E-779E-4CA2-9A1D-C96F979818AE}" type="slidenum">
               <a:rPr lang="en-IE" smtClean="0"/>
+              <a:pPr/>
               <a:t>‹#›</a:t>
             </a:fld>
             <a:endParaRPr lang="en-IE"/>
@@ -3079,7 +3099,8 @@
           <a:p>
             <a:fld id="{3246753B-1CBA-40BC-BB74-CA1BFC259E4F}" type="datetimeFigureOut">
               <a:rPr lang="en-IE" smtClean="0"/>
-              <a:t>24/04/2019</a:t>
+              <a:pPr/>
+              <a:t>26/04/2019</a:t>
             </a:fld>
             <a:endParaRPr lang="en-IE"/>
           </a:p>
@@ -3144,6 +3165,7 @@
           <a:p>
             <a:fld id="{6860702E-779E-4CA2-9A1D-C96F979818AE}" type="slidenum">
               <a:rPr lang="en-IE" smtClean="0"/>
+              <a:pPr/>
               <a:t>‹#›</a:t>
             </a:fld>
             <a:endParaRPr lang="en-IE"/>
@@ -4188,7 +4210,8 @@
           <a:p>
             <a:fld id="{3246753B-1CBA-40BC-BB74-CA1BFC259E4F}" type="datetimeFigureOut">
               <a:rPr lang="en-IE" smtClean="0"/>
-              <a:t>24/04/2019</a:t>
+              <a:pPr/>
+              <a:t>26/04/2019</a:t>
             </a:fld>
             <a:endParaRPr lang="en-IE"/>
           </a:p>
@@ -4264,6 +4287,7 @@
           <a:p>
             <a:fld id="{6860702E-779E-4CA2-9A1D-C96F979818AE}" type="slidenum">
               <a:rPr lang="en-IE" smtClean="0"/>
+              <a:pPr/>
               <a:t>‹#›</a:t>
             </a:fld>
             <a:endParaRPr lang="en-IE"/>
@@ -4701,142 +4725,70 @@
         <p:spPr/>
         <p:txBody>
           <a:bodyPr>
-            <a:normAutofit fontScale="92500" lnSpcReduction="10000"/>
+            <a:normAutofit/>
           </a:bodyPr>
           <a:lstStyle/>
           <a:p>
             <a:r>
-              <a:rPr lang="en-IE" sz="2000" dirty="0" smtClean="0"/>
-              <a:t>Programming Language: C#, JavaScript and HTML</a:t>
-            </a:r>
-          </a:p>
-          <a:p>
-            <a:r>
-              <a:rPr lang="en-IE" sz="2000" dirty="0" smtClean="0"/>
-              <a:t>IDE: Visual Studio Code</a:t>
-            </a:r>
-          </a:p>
-          <a:p>
-            <a:r>
-              <a:rPr lang="en-IE" sz="2000" dirty="0" smtClean="0"/>
-              <a:t>Framework: </a:t>
-            </a:r>
-            <a:r>
-              <a:rPr lang="en-IE" sz="2000" dirty="0" err="1" smtClean="0"/>
-              <a:t>.Net</a:t>
-            </a:r>
-            <a:r>
-              <a:rPr lang="en-IE" sz="2000" dirty="0" smtClean="0"/>
-              <a:t> Core 2.2</a:t>
-            </a:r>
-          </a:p>
-          <a:p>
-            <a:r>
-              <a:rPr lang="en-IE" sz="2000" dirty="0" smtClean="0"/>
-              <a:t>Supporting Platforms: Windows, Linux, </a:t>
-            </a:r>
-            <a:r>
-              <a:rPr lang="en-IE" sz="2000" dirty="0" err="1" smtClean="0"/>
-              <a:t>MacOS</a:t>
-            </a:r>
-            <a:endParaRPr lang="en-IE" sz="2000" dirty="0" smtClean="0"/>
-          </a:p>
-          <a:p>
-            <a:r>
-              <a:rPr lang="en-IE" sz="2000" dirty="0" smtClean="0"/>
-              <a:t>Pattern: MVC (Model View Controller)</a:t>
-            </a:r>
-          </a:p>
-          <a:p>
-            <a:r>
-              <a:rPr lang="en-IE" sz="2000" dirty="0" smtClean="0"/>
-              <a:t>Type App: ASP.NET MVC Web Application includes b</a:t>
-            </a:r>
-            <a:r>
-              <a:rPr lang="en-IE" sz="2000" dirty="0" smtClean="0"/>
-              <a:t>ootstrapping </a:t>
-            </a:r>
-          </a:p>
-          <a:p>
-            <a:r>
-              <a:rPr lang="en-IE" sz="2000" dirty="0" smtClean="0"/>
-              <a:t>Database: </a:t>
-            </a:r>
-            <a:r>
-              <a:rPr lang="en-IE" sz="2000" dirty="0" err="1" smtClean="0"/>
-              <a:t>MySQL</a:t>
-            </a:r>
-            <a:endParaRPr lang="en-IE" sz="2000" dirty="0" smtClean="0"/>
-          </a:p>
-          <a:p>
-            <a:r>
-              <a:rPr lang="en-IE" sz="2000" dirty="0" smtClean="0"/>
-              <a:t>Security</a:t>
-            </a:r>
-          </a:p>
-          <a:p>
-            <a:pPr lvl="1"/>
-            <a:r>
-              <a:rPr lang="en-IE" sz="1600" dirty="0" smtClean="0"/>
-              <a:t>Authentication: Token Based, Password hash (</a:t>
-            </a:r>
-            <a:r>
-              <a:rPr lang="en-IE" sz="1600" dirty="0"/>
-              <a:t>PBKDF2 algorithm with HMAC-SHA256, 128-bit salt, 256-bit </a:t>
-            </a:r>
-            <a:r>
-              <a:rPr lang="en-IE" sz="1600" dirty="0" err="1"/>
-              <a:t>subkey</a:t>
-            </a:r>
-            <a:r>
-              <a:rPr lang="en-IE" sz="1600" dirty="0"/>
-              <a:t>, and 10,000 </a:t>
-            </a:r>
-            <a:r>
-              <a:rPr lang="en-IE" sz="1600" dirty="0" smtClean="0"/>
-              <a:t>iterations)</a:t>
-            </a:r>
-          </a:p>
-          <a:p>
-            <a:pPr lvl="1"/>
-            <a:r>
-              <a:rPr lang="en-IE" sz="1600" dirty="0" smtClean="0"/>
-              <a:t>Authorization: Role-based Authorization</a:t>
-            </a:r>
-          </a:p>
-          <a:p>
-            <a:r>
-              <a:rPr lang="en-IE" sz="2000" dirty="0" smtClean="0"/>
-              <a:t>Hosting Server: Linux </a:t>
-            </a:r>
-            <a:r>
-              <a:rPr lang="en-IE" sz="2000" dirty="0" err="1" smtClean="0"/>
-              <a:t>Ubuntu</a:t>
-            </a:r>
-            <a:r>
-              <a:rPr lang="en-IE" sz="2000" dirty="0" smtClean="0"/>
-              <a:t> 16.04 (using Apache as reverse proxy)</a:t>
-            </a:r>
-          </a:p>
-          <a:p>
-            <a:r>
-              <a:rPr lang="en-IE" sz="2000" dirty="0" smtClean="0"/>
-              <a:t>Performance Tests: </a:t>
-            </a:r>
-            <a:r>
-              <a:rPr lang="en-IE" sz="2000" dirty="0" err="1" smtClean="0"/>
-              <a:t>wrk</a:t>
-            </a:r>
-            <a:r>
-              <a:rPr lang="en-IE" sz="2000" dirty="0" smtClean="0"/>
-              <a:t> Performance Tool (Open-source)</a:t>
-            </a:r>
-          </a:p>
-          <a:p>
-            <a:r>
-              <a:rPr lang="en-IE" sz="2000" dirty="0" smtClean="0"/>
-              <a:t>Coding Standards Documentation Completed</a:t>
-            </a:r>
+              <a:rPr lang="en-US" sz="2000" dirty="0" smtClean="0"/>
+              <a:t>Web application access </a:t>
+            </a:r>
+            <a:r>
+              <a:rPr lang="en-US" sz="2000" dirty="0"/>
+              <a:t>via a web browser</a:t>
+            </a:r>
+            <a:endParaRPr lang="en-IE" sz="2000" dirty="0"/>
+          </a:p>
+          <a:p>
+            <a:r>
+              <a:rPr lang="en-US" sz="2000" dirty="0" smtClean="0"/>
+              <a:t>Customer Register and Login </a:t>
+            </a:r>
+          </a:p>
+          <a:p>
+            <a:r>
+              <a:rPr lang="en-US" sz="2000" dirty="0" smtClean="0"/>
+              <a:t>Admin </a:t>
+            </a:r>
+            <a:r>
+              <a:rPr lang="en-US" sz="2000" dirty="0"/>
+              <a:t>users to manage all </a:t>
+            </a:r>
+            <a:r>
+              <a:rPr lang="en-US" sz="2000" dirty="0" smtClean="0"/>
+              <a:t>users and allocate roles</a:t>
+            </a:r>
+          </a:p>
+          <a:p>
+            <a:r>
+              <a:rPr lang="en-US" sz="2000" dirty="0" smtClean="0"/>
+              <a:t>Admin access/edit detailed Information</a:t>
+            </a:r>
+            <a:endParaRPr lang="en-IE" sz="2000" dirty="0"/>
+          </a:p>
+          <a:p>
+            <a:r>
+              <a:rPr lang="en-US" sz="2000" dirty="0" smtClean="0"/>
+              <a:t>System calculates building cost </a:t>
+            </a:r>
+            <a:r>
+              <a:rPr lang="en-US" sz="2000" dirty="0"/>
+              <a:t>analysis and display costing to the customer</a:t>
+            </a:r>
+            <a:endParaRPr lang="en-IE" sz="2000" dirty="0"/>
+          </a:p>
+          <a:p>
+            <a:r>
+              <a:rPr lang="en-US" sz="2000" dirty="0" smtClean="0"/>
+              <a:t>Admin to manage costs </a:t>
+            </a:r>
+            <a:r>
+              <a:rPr lang="en-US" sz="2000" dirty="0"/>
+              <a:t>exceed €1 million.</a:t>
+            </a:r>
+            <a:endParaRPr lang="en-IE" sz="2000" dirty="0"/>
+          </a:p>
+          <a:p>
             <a:endParaRPr lang="en-IE" sz="2000" dirty="0"/>
           </a:p>
         </p:txBody>
@@ -4858,12 +4810,42 @@
           <a:p>
             <a:r>
               <a:rPr lang="en-IE" dirty="0" smtClean="0"/>
-              <a:t>Code Created - Technical</a:t>
+              <a:t>Code Created - Solution</a:t>
             </a:r>
             <a:endParaRPr lang="en-IE" dirty="0"/>
           </a:p>
         </p:txBody>
       </p:sp>
+      <p:pic>
+        <p:nvPicPr>
+          <p:cNvPr id="4" name="Picture 3"/>
+          <p:cNvPicPr/>
+          <p:nvPr/>
+        </p:nvPicPr>
+        <p:blipFill>
+          <a:blip r:embed="rId2" cstate="print"/>
+          <a:srcRect/>
+          <a:stretch>
+            <a:fillRect/>
+          </a:stretch>
+        </p:blipFill>
+        <p:spPr bwMode="auto">
+          <a:xfrm>
+            <a:off x="395536" y="4221088"/>
+            <a:ext cx="8424936" cy="2448272"/>
+          </a:xfrm>
+          <a:prstGeom prst="rect">
+            <a:avLst/>
+          </a:prstGeom>
+          <a:noFill/>
+          <a:ln w="9525">
+            <a:noFill/>
+            <a:miter lim="800000"/>
+            <a:headEnd/>
+            <a:tailEnd/>
+          </a:ln>
+        </p:spPr>
+      </p:pic>
     </p:spTree>
   </p:cSld>
   <p:clrMapOvr>
@@ -4909,70 +4891,138 @@
         <p:spPr/>
         <p:txBody>
           <a:bodyPr>
-            <a:normAutofit/>
+            <a:normAutofit fontScale="92500" lnSpcReduction="10000"/>
           </a:bodyPr>
           <a:lstStyle/>
           <a:p>
             <a:r>
-              <a:rPr lang="en-US" sz="2000" dirty="0" smtClean="0"/>
-              <a:t>Web application access </a:t>
-            </a:r>
-            <a:r>
-              <a:rPr lang="en-US" sz="2000" dirty="0"/>
-              <a:t>via a web browser</a:t>
-            </a:r>
-            <a:endParaRPr lang="en-IE" sz="2000" dirty="0"/>
-          </a:p>
-          <a:p>
-            <a:r>
-              <a:rPr lang="en-US" sz="2000" dirty="0" smtClean="0"/>
-              <a:t>Customer Register and Login </a:t>
-            </a:r>
-          </a:p>
-          <a:p>
-            <a:r>
-              <a:rPr lang="en-US" sz="2000" dirty="0" smtClean="0"/>
-              <a:t>Admin </a:t>
-            </a:r>
-            <a:r>
-              <a:rPr lang="en-US" sz="2000" dirty="0"/>
-              <a:t>users to manage all </a:t>
-            </a:r>
-            <a:r>
-              <a:rPr lang="en-US" sz="2000" dirty="0" smtClean="0"/>
-              <a:t>users and allocate roles</a:t>
-            </a:r>
-          </a:p>
-          <a:p>
-            <a:r>
-              <a:rPr lang="en-US" sz="2000" dirty="0" smtClean="0"/>
-              <a:t>Admin access/edit detailed Information</a:t>
-            </a:r>
-            <a:endParaRPr lang="en-IE" sz="2000" dirty="0"/>
-          </a:p>
-          <a:p>
-            <a:r>
-              <a:rPr lang="en-US" sz="2000" dirty="0" smtClean="0"/>
-              <a:t>System calculates building cost </a:t>
-            </a:r>
-            <a:r>
-              <a:rPr lang="en-US" sz="2000" dirty="0"/>
-              <a:t>analysis and display costing to the customer</a:t>
-            </a:r>
-            <a:endParaRPr lang="en-IE" sz="2000" dirty="0"/>
-          </a:p>
-          <a:p>
-            <a:r>
-              <a:rPr lang="en-US" sz="2000" dirty="0" smtClean="0"/>
-              <a:t>Admin to manage costs </a:t>
-            </a:r>
-            <a:r>
-              <a:rPr lang="en-US" sz="2000" dirty="0"/>
-              <a:t>exceed €1 million.</a:t>
-            </a:r>
-            <a:endParaRPr lang="en-IE" sz="2000" dirty="0"/>
-          </a:p>
-          <a:p>
+              <a:rPr lang="en-IE" sz="2000" dirty="0" smtClean="0"/>
+              <a:t>Programming Language: C#, JavaScript and HTML</a:t>
+            </a:r>
+          </a:p>
+          <a:p>
+            <a:r>
+              <a:rPr lang="en-IE" sz="2000" dirty="0" smtClean="0"/>
+              <a:t>IDE: Visual Studio Code</a:t>
+            </a:r>
+          </a:p>
+          <a:p>
+            <a:r>
+              <a:rPr lang="en-IE" sz="2000" dirty="0" smtClean="0"/>
+              <a:t>Framework: </a:t>
+            </a:r>
+            <a:r>
+              <a:rPr lang="en-IE" sz="2000" dirty="0" err="1" smtClean="0"/>
+              <a:t>.Net</a:t>
+            </a:r>
+            <a:r>
+              <a:rPr lang="en-IE" sz="2000" dirty="0" smtClean="0"/>
+              <a:t> Core 2.2</a:t>
+            </a:r>
+          </a:p>
+          <a:p>
+            <a:r>
+              <a:rPr lang="en-IE" sz="2000" dirty="0" smtClean="0"/>
+              <a:t>Supporting Platforms: Windows, Linux, </a:t>
+            </a:r>
+            <a:r>
+              <a:rPr lang="en-IE" sz="2000" dirty="0" err="1" smtClean="0"/>
+              <a:t>MacOS</a:t>
+            </a:r>
+            <a:endParaRPr lang="en-IE" sz="2000" dirty="0" smtClean="0"/>
+          </a:p>
+          <a:p>
+            <a:r>
+              <a:rPr lang="en-IE" sz="2000" dirty="0" smtClean="0"/>
+              <a:t>Pattern: MVC (Model View Controller)</a:t>
+            </a:r>
+          </a:p>
+          <a:p>
+            <a:r>
+              <a:rPr lang="en-IE" sz="2000" dirty="0" smtClean="0"/>
+              <a:t>Type App: ASP.NET MVC Web Application includes bootstrapping </a:t>
+            </a:r>
+          </a:p>
+          <a:p>
+            <a:r>
+              <a:rPr lang="en-IE" sz="2000" dirty="0" smtClean="0"/>
+              <a:t>Database: </a:t>
+            </a:r>
+            <a:r>
+              <a:rPr lang="en-IE" sz="2000" dirty="0" err="1" smtClean="0"/>
+              <a:t>MySQL</a:t>
+            </a:r>
+            <a:endParaRPr lang="en-IE" sz="2000" dirty="0" smtClean="0"/>
+          </a:p>
+          <a:p>
+            <a:r>
+              <a:rPr lang="en-IE" sz="2000" dirty="0" smtClean="0"/>
+              <a:t>Security</a:t>
+            </a:r>
+          </a:p>
+          <a:p>
+            <a:pPr lvl="1"/>
+            <a:r>
+              <a:rPr lang="en-IE" sz="1600" dirty="0" smtClean="0"/>
+              <a:t>Authentication: Token Based, Password hash (</a:t>
+            </a:r>
+            <a:r>
+              <a:rPr lang="en-IE" sz="1600" dirty="0"/>
+              <a:t>PBKDF2 algorithm with HMAC-SHA256, 128-bit salt, 256-bit </a:t>
+            </a:r>
+            <a:r>
+              <a:rPr lang="en-IE" sz="1600" dirty="0" err="1"/>
+              <a:t>subkey</a:t>
+            </a:r>
+            <a:r>
+              <a:rPr lang="en-IE" sz="1600" dirty="0"/>
+              <a:t>, and 10,000 </a:t>
+            </a:r>
+            <a:r>
+              <a:rPr lang="en-IE" sz="1600" dirty="0" smtClean="0"/>
+              <a:t>iterations)</a:t>
+            </a:r>
+          </a:p>
+          <a:p>
+            <a:pPr lvl="1"/>
+            <a:r>
+              <a:rPr lang="en-IE" sz="1600" dirty="0" smtClean="0"/>
+              <a:t>Authorization: Role-based Authorization</a:t>
+            </a:r>
+          </a:p>
+          <a:p>
+            <a:r>
+              <a:rPr lang="en-IE" sz="2000" dirty="0" smtClean="0"/>
+              <a:t>Hosting Server: Linux </a:t>
+            </a:r>
+            <a:r>
+              <a:rPr lang="en-IE" sz="2000" dirty="0" err="1" smtClean="0"/>
+              <a:t>Ubuntu</a:t>
+            </a:r>
+            <a:r>
+              <a:rPr lang="en-IE" sz="2000" dirty="0" smtClean="0"/>
+              <a:t> 16.04 (using Apache as reverse proxy)</a:t>
+            </a:r>
+          </a:p>
+          <a:p>
+            <a:r>
+              <a:rPr lang="en-IE" sz="2000" dirty="0" smtClean="0"/>
+              <a:t>Performance Tests: </a:t>
+            </a:r>
+            <a:r>
+              <a:rPr lang="en-IE" sz="2000" dirty="0" err="1" smtClean="0"/>
+              <a:t>wrk</a:t>
+            </a:r>
+            <a:r>
+              <a:rPr lang="en-IE" sz="2000" dirty="0" smtClean="0"/>
+              <a:t> Performance Tool (Open-source)</a:t>
+            </a:r>
+          </a:p>
+          <a:p>
+            <a:r>
+              <a:rPr lang="en-IE" sz="2000" dirty="0" smtClean="0"/>
+              <a:t>Coding Standards Documentation Completed</a:t>
+            </a:r>
             <a:endParaRPr lang="en-IE" sz="2000" dirty="0"/>
           </a:p>
         </p:txBody>
@@ -4994,42 +5044,12 @@
           <a:p>
             <a:r>
               <a:rPr lang="en-IE" dirty="0" smtClean="0"/>
-              <a:t>Code Created - Solution</a:t>
+              <a:t>Code Created - Technical</a:t>
             </a:r>
             <a:endParaRPr lang="en-IE" dirty="0"/>
           </a:p>
         </p:txBody>
       </p:sp>
-      <p:pic>
-        <p:nvPicPr>
-          <p:cNvPr id="4" name="Picture 3"/>
-          <p:cNvPicPr/>
-          <p:nvPr/>
-        </p:nvPicPr>
-        <p:blipFill>
-          <a:blip r:embed="rId2" cstate="print"/>
-          <a:srcRect/>
-          <a:stretch>
-            <a:fillRect/>
-          </a:stretch>
-        </p:blipFill>
-        <p:spPr bwMode="auto">
-          <a:xfrm>
-            <a:off x="395536" y="4221088"/>
-            <a:ext cx="8424936" cy="2448272"/>
-          </a:xfrm>
-          <a:prstGeom prst="rect">
-            <a:avLst/>
-          </a:prstGeom>
-          <a:noFill/>
-          <a:ln w="9525">
-            <a:noFill/>
-            <a:miter lim="800000"/>
-            <a:headEnd/>
-            <a:tailEnd/>
-          </a:ln>
-        </p:spPr>
-      </p:pic>
     </p:spTree>
   </p:cSld>
   <p:clrMapOvr>

</xml_diff>